<commit_message>
Updated in class 5
</commit_message>
<xml_diff>
--- a/slides/05-Java面向对象编程-类与对象.pptx
+++ b/slides/05-Java面向对象编程-类与对象.pptx
@@ -483,7 +483,7 @@
               <a:pPr>
                 <a:defRPr/>
               </a:pPr>
-              <a:t>2024/3/11</a:t>
+              <a:t>2024/3/12</a:t>
             </a:fld>
             <a:endParaRPr lang="zh-CN" altLang="en-US"/>
           </a:p>
@@ -3247,7 +3247,7 @@
               <a:pPr>
                 <a:defRPr/>
               </a:pPr>
-              <a:t>2024/3/11</a:t>
+              <a:t>2024/3/12</a:t>
             </a:fld>
             <a:endParaRPr lang="zh-CN" altLang="en-US"/>
           </a:p>
@@ -3588,7 +3588,7 @@
               <a:pPr>
                 <a:defRPr/>
               </a:pPr>
-              <a:t>2024/3/11</a:t>
+              <a:t>2024/3/12</a:t>
             </a:fld>
             <a:endParaRPr lang="zh-CN" altLang="en-US"/>
           </a:p>
@@ -3851,7 +3851,7 @@
               <a:pPr>
                 <a:defRPr/>
               </a:pPr>
-              <a:t>2024/3/11</a:t>
+              <a:t>2024/3/12</a:t>
             </a:fld>
             <a:endParaRPr lang="zh-CN" altLang="en-US"/>
           </a:p>
@@ -4114,7 +4114,7 @@
               <a:pPr>
                 <a:defRPr/>
               </a:pPr>
-              <a:t>2024/3/11</a:t>
+              <a:t>2024/3/12</a:t>
             </a:fld>
             <a:endParaRPr lang="zh-CN" altLang="en-US"/>
           </a:p>
@@ -4422,7 +4422,7 @@
           <a:p>
             <a:fld id="{727B9DD9-119C-4B8D-B3AB-3CFC6AE69930}" type="datetimeFigureOut">
               <a:rPr lang="zh-CN" altLang="en-US" smtClean="0"/>
-              <a:t>2024/3/11</a:t>
+              <a:t>2024/3/12</a:t>
             </a:fld>
             <a:endParaRPr lang="zh-CN" altLang="en-US"/>
           </a:p>
@@ -4502,7 +4502,7 @@
         <p:random/>
       </p:transition>
     </mc:Choice>
-    <mc:Fallback xmlns="" xmlns:p15="http://schemas.microsoft.com/office/powerpoint/2012/main">
+    <mc:Fallback xmlns:p15="http://schemas.microsoft.com/office/powerpoint/2012/main" xmlns="">
       <p:transition spd="slow" advClick="0">
         <p:random/>
       </p:transition>
@@ -5784,7 +5784,7 @@
               <a:pPr>
                 <a:defRPr/>
               </a:pPr>
-              <a:t>2024/3/11</a:t>
+              <a:t>2024/3/12</a:t>
             </a:fld>
             <a:endParaRPr lang="zh-CN" altLang="en-US"/>
           </a:p>
@@ -6302,7 +6302,7 @@
               <a:pPr>
                 <a:defRPr/>
               </a:pPr>
-              <a:t>2024/3/11</a:t>
+              <a:t>2024/3/12</a:t>
             </a:fld>
             <a:endParaRPr lang="zh-CN" altLang="en-US"/>
           </a:p>
@@ -6506,7 +6506,7 @@
               <a:pPr>
                 <a:defRPr/>
               </a:pPr>
-              <a:t>2024/3/11</a:t>
+              <a:t>2024/3/12</a:t>
             </a:fld>
             <a:endParaRPr lang="zh-CN" altLang="en-US"/>
           </a:p>
@@ -6680,7 +6680,7 @@
               <a:pPr>
                 <a:defRPr/>
               </a:pPr>
-              <a:t>2024/3/11</a:t>
+              <a:t>2024/3/12</a:t>
             </a:fld>
             <a:endParaRPr lang="zh-CN" altLang="en-US"/>
           </a:p>
@@ -7540,7 +7540,7 @@
         <p:blinds dir="vert"/>
       </p:transition>
     </mc:Choice>
-    <mc:Fallback xmlns="" xmlns:p15="http://schemas.microsoft.com/office/powerpoint/2012/main">
+    <mc:Fallback xmlns:p15="http://schemas.microsoft.com/office/powerpoint/2012/main" xmlns="">
       <p:transition spd="slow" advClick="0">
         <p:blinds dir="vert"/>
       </p:transition>
@@ -8461,7 +8461,7 @@
         <p:blinds dir="vert"/>
       </p:transition>
     </mc:Choice>
-    <mc:Fallback xmlns="" xmlns:p15="http://schemas.microsoft.com/office/powerpoint/2012/main">
+    <mc:Fallback xmlns:p15="http://schemas.microsoft.com/office/powerpoint/2012/main" xmlns="">
       <p:transition spd="slow" advClick="0">
         <p:blinds dir="vert"/>
       </p:transition>
@@ -9478,7 +9478,7 @@
         <p:blinds dir="vert"/>
       </p:transition>
     </mc:Choice>
-    <mc:Fallback xmlns="" xmlns:p15="http://schemas.microsoft.com/office/powerpoint/2012/main">
+    <mc:Fallback xmlns:p15="http://schemas.microsoft.com/office/powerpoint/2012/main" xmlns="">
       <p:transition spd="slow" advClick="0">
         <p:blinds dir="vert"/>
       </p:transition>
@@ -10300,7 +10300,7 @@
         <p:blinds dir="vert"/>
       </p:transition>
     </mc:Choice>
-    <mc:Fallback xmlns="" xmlns:p15="http://schemas.microsoft.com/office/powerpoint/2012/main">
+    <mc:Fallback xmlns:p15="http://schemas.microsoft.com/office/powerpoint/2012/main" xmlns="">
       <p:transition spd="slow" advClick="0">
         <p:blinds dir="vert"/>
       </p:transition>
@@ -11843,7 +11843,27 @@
                   <a:latin typeface="Times New Roman" panose="02020603050405020304" pitchFamily="18" charset="0"/>
                   <a:cs typeface="Times New Roman" panose="02020603050405020304" pitchFamily="18" charset="0"/>
                 </a:rPr>
-                <a:t>Radius: double</a:t>
+                <a:t>r</a:t>
+              </a:r>
+              <a:r>
+                <a:rPr lang="en-US" altLang="zh-CN">
+                  <a:solidFill>
+                    <a:srgbClr val="FF0000"/>
+                  </a:solidFill>
+                  <a:latin typeface="Times New Roman" panose="02020603050405020304" pitchFamily="18" charset="0"/>
+                  <a:cs typeface="Times New Roman" panose="02020603050405020304" pitchFamily="18" charset="0"/>
+                </a:rPr>
+                <a:t>adius</a:t>
+              </a:r>
+              <a:r>
+                <a:rPr lang="en-US" altLang="zh-CN" dirty="0">
+                  <a:solidFill>
+                    <a:srgbClr val="FF0000"/>
+                  </a:solidFill>
+                  <a:latin typeface="Times New Roman" panose="02020603050405020304" pitchFamily="18" charset="0"/>
+                  <a:cs typeface="Times New Roman" panose="02020603050405020304" pitchFamily="18" charset="0"/>
+                </a:rPr>
+                <a:t>: double</a:t>
               </a:r>
             </a:p>
             <a:p>
@@ -11855,7 +11875,7 @@
                   <a:latin typeface="Times New Roman" panose="02020603050405020304" pitchFamily="18" charset="0"/>
                   <a:cs typeface="Times New Roman" panose="02020603050405020304" pitchFamily="18" charset="0"/>
                 </a:rPr>
-                <a:t>Height: int</a:t>
+                <a:t>height: int</a:t>
               </a:r>
               <a:endParaRPr lang="zh-CN" altLang="en-US" dirty="0">
                 <a:solidFill>
@@ -13131,7 +13151,7 @@
         <p:blinds dir="vert"/>
       </p:transition>
     </mc:Choice>
-    <mc:Fallback xmlns="" xmlns:p15="http://schemas.microsoft.com/office/powerpoint/2012/main">
+    <mc:Fallback xmlns:p15="http://schemas.microsoft.com/office/powerpoint/2012/main" xmlns="">
       <p:transition spd="slow" advClick="0">
         <p:blinds dir="vert"/>
       </p:transition>
@@ -14765,7 +14785,7 @@
         <p:blinds dir="vert"/>
       </p:transition>
     </mc:Choice>
-    <mc:Fallback xmlns="" xmlns:p15="http://schemas.microsoft.com/office/powerpoint/2012/main">
+    <mc:Fallback xmlns:p15="http://schemas.microsoft.com/office/powerpoint/2012/main" xmlns="">
       <p:transition spd="slow" advClick="0">
         <p:blinds dir="vert"/>
       </p:transition>
@@ -19174,7 +19194,7 @@
         <p14:prism/>
       </p:transition>
     </mc:Choice>
-    <mc:Fallback xmlns="" xmlns:p15="http://schemas.microsoft.com/office/powerpoint/2012/main">
+    <mc:Fallback xmlns:p15="http://schemas.microsoft.com/office/powerpoint/2012/main" xmlns="">
       <p:transition spd="slow" advClick="0">
         <p:fade/>
       </p:transition>
@@ -20211,7 +20231,7 @@
         <p:blinds dir="vert"/>
       </p:transition>
     </mc:Choice>
-    <mc:Fallback xmlns="" xmlns:p15="http://schemas.microsoft.com/office/powerpoint/2012/main">
+    <mc:Fallback xmlns:p15="http://schemas.microsoft.com/office/powerpoint/2012/main" xmlns="">
       <p:transition spd="slow" advClick="0">
         <p:blinds dir="vert"/>
       </p:transition>
@@ -21586,7 +21606,7 @@
         <p:blinds dir="vert"/>
       </p:transition>
     </mc:Choice>
-    <mc:Fallback xmlns="" xmlns:p15="http://schemas.microsoft.com/office/powerpoint/2012/main">
+    <mc:Fallback xmlns:p15="http://schemas.microsoft.com/office/powerpoint/2012/main" xmlns="">
       <p:transition spd="slow" advClick="0">
         <p:blinds dir="vert"/>
       </p:transition>
@@ -22234,7 +22254,7 @@
         <p:blinds dir="vert"/>
       </p:transition>
     </mc:Choice>
-    <mc:Fallback xmlns="" xmlns:p15="http://schemas.microsoft.com/office/powerpoint/2012/main">
+    <mc:Fallback xmlns:p15="http://schemas.microsoft.com/office/powerpoint/2012/main" xmlns="">
       <p:transition spd="slow" advClick="0">
         <p:blinds dir="vert"/>
       </p:transition>
@@ -22967,7 +22987,7 @@
         <p:blinds dir="vert"/>
       </p:transition>
     </mc:Choice>
-    <mc:Fallback xmlns="" xmlns:p15="http://schemas.microsoft.com/office/powerpoint/2012/main">
+    <mc:Fallback xmlns:p15="http://schemas.microsoft.com/office/powerpoint/2012/main" xmlns="">
       <p:transition spd="slow" advClick="0">
         <p:blinds dir="vert"/>
       </p:transition>
@@ -23258,7 +23278,7 @@
     <mc:Choice Requires="p14">
       <p:transition spd="slow" p14:dur="2000" advClick="0"/>
     </mc:Choice>
-    <mc:Fallback xmlns="" xmlns:p15="http://schemas.microsoft.com/office/powerpoint/2012/main">
+    <mc:Fallback xmlns:p15="http://schemas.microsoft.com/office/powerpoint/2012/main" xmlns="">
       <p:transition spd="slow" advClick="0"/>
     </mc:Fallback>
   </mc:AlternateContent>
@@ -25631,7 +25651,7 @@
         <p:blinds dir="vert"/>
       </p:transition>
     </mc:Choice>
-    <mc:Fallback xmlns="" xmlns:p15="http://schemas.microsoft.com/office/powerpoint/2012/main">
+    <mc:Fallback xmlns:p15="http://schemas.microsoft.com/office/powerpoint/2012/main" xmlns="">
       <p:transition spd="slow" advClick="0">
         <p:blinds dir="vert"/>
       </p:transition>

</xml_diff>